<commit_message>
add MQ_factoring_cracks_RSA to text, MQ_RSA_collision_probability_200 [1, to [0,
</commit_message>
<xml_diff>
--- a/spring12/slidesS12/dags.pptx
+++ b/spring12/slidesS12/dags.pptx
@@ -3047,12 +3047,6 @@
               </a:rPr>
               <a:t>Graphs</a:t>
             </a:r>
-            <a:endParaRPr lang="en-US" sz="8800" dirty="0" smtClean="0">
-              <a:solidFill>
-                <a:schemeClr val="tx2"/>
-              </a:solidFill>
-              <a:cs typeface="Arial" charset="0"/>
-            </a:endParaRPr>
           </a:p>
           <a:p>
             <a:pPr algn="ctr"/>
@@ -3063,7 +3057,16 @@
                 </a:solidFill>
                 <a:cs typeface="Arial" charset="0"/>
               </a:rPr>
-              <a:t>(Digraphs)</a:t>
+              <a:t>(</a:t>
+            </a:r>
+            <a:r>
+              <a:rPr lang="en-US" sz="8800" dirty="0" smtClean="0">
+                <a:solidFill>
+                  <a:schemeClr val="tx2"/>
+                </a:solidFill>
+                <a:cs typeface="Arial" charset="0"/>
+              </a:rPr>
+              <a:t>DAGs)</a:t>
             </a:r>
             <a:endParaRPr lang="en-US" sz="8800" dirty="0">
               <a:solidFill>
@@ -3413,7 +3416,6 @@
               <a:rPr lang="en-US" sz="6000" dirty="0" smtClean="0"/>
               <a:t>only repeat vertex is </a:t>
             </a:r>
-            <a:endParaRPr lang="en-US" sz="6000" dirty="0" smtClean="0"/>
           </a:p>
           <a:p>
             <a:pPr>
@@ -3422,17 +3424,8 @@
             </a:pPr>
             <a:r>
               <a:rPr lang="en-US" sz="6000" dirty="0" smtClean="0"/>
-              <a:t>its start </a:t>
-            </a:r>
-            <a:r>
-              <a:rPr lang="en-US" sz="6000" dirty="0" smtClean="0"/>
-              <a:t>&amp; end</a:t>
-            </a:r>
-            <a:r>
-              <a:rPr lang="en-US" sz="6000" dirty="0" smtClean="0"/>
-              <a:t>.</a:t>
-            </a:r>
-            <a:endParaRPr lang="en-US" sz="6000" dirty="0" smtClean="0"/>
+              <a:t>its start &amp; end.</a:t>
+            </a:r>
           </a:p>
         </p:txBody>
       </p:sp>
@@ -5508,7 +5501,6 @@
               <a:rPr lang="en-US" sz="4800" dirty="0" smtClean="0"/>
               <a:t> starts &amp; ends at </a:t>
             </a:r>
-            <a:endParaRPr lang="en-US" sz="4800" dirty="0" smtClean="0"/>
           </a:p>
           <a:p>
             <a:pPr eaLnBrk="1" hangingPunct="1">
@@ -5520,11 +5512,7 @@
             </a:pPr>
             <a:r>
               <a:rPr lang="en-US" sz="4800" dirty="0" smtClean="0"/>
-              <a:t>the same </a:t>
-            </a:r>
-            <a:r>
-              <a:rPr lang="en-US" sz="4800" dirty="0" smtClean="0"/>
-              <a:t>vertex.</a:t>
+              <a:t>the same vertex.</a:t>
             </a:r>
             <a:endParaRPr lang="en-US" sz="4800" dirty="0"/>
           </a:p>
@@ -5587,23 +5575,11 @@
                   <a:srgbClr val="FF00FF"/>
                 </a:solidFill>
               </a:rPr>
-              <a:t>closed </a:t>
-            </a:r>
-            <a:r>
-              <a:rPr lang="en-US" sz="4800" dirty="0" smtClean="0">
-                <a:solidFill>
-                  <a:srgbClr val="FF00FF"/>
-                </a:solidFill>
-              </a:rPr>
-              <a:t>walk</a:t>
+              <a:t>closed walk</a:t>
             </a:r>
             <a:r>
               <a:rPr lang="en-US" sz="4800" dirty="0" smtClean="0"/>
-              <a:t> </a:t>
-            </a:r>
-            <a:r>
-              <a:rPr lang="en-US" sz="4800" dirty="0" smtClean="0"/>
-              <a:t>from </a:t>
+              <a:t> from </a:t>
             </a:r>
             <a:r>
               <a:rPr lang="en-US" sz="4800" dirty="0" smtClean="0">
@@ -5698,21 +5674,8 @@
                   <a:srgbClr val="000000"/>
                 </a:solidFill>
               </a:rPr>
-              <a:t> </a:t>
-            </a:r>
-            <a:r>
-              <a:rPr lang="en-US" sz="4400" dirty="0" smtClean="0">
-                <a:solidFill>
-                  <a:srgbClr val="000000"/>
-                </a:solidFill>
-              </a:rPr>
-              <a:t>like shortest walk is path</a:t>
-            </a:r>
-            <a:endParaRPr lang="en-US" sz="4400" dirty="0" smtClean="0">
-              <a:solidFill>
-                <a:srgbClr val="000000"/>
-              </a:solidFill>
-            </a:endParaRPr>
+              <a:t> like shortest walk is path</a:t>
+            </a:r>
           </a:p>
         </p:txBody>
       </p:sp>
@@ -5738,11 +5701,7 @@
           <a:p>
             <a:r>
               <a:rPr lang="en-US" sz="4800" dirty="0" smtClean="0"/>
-              <a:t>Closed </a:t>
-            </a:r>
-            <a:r>
-              <a:rPr lang="en-US" sz="4800" dirty="0" smtClean="0"/>
-              <a:t>Walks</a:t>
+              <a:t>Closed Walks</a:t>
             </a:r>
             <a:endParaRPr lang="en-US" sz="4800" dirty="0"/>
           </a:p>

</xml_diff>